<commit_message>
update teaser and system graphics
</commit_message>
<xml_diff>
--- a/server/analysis/charts/figures.pptx
+++ b/server/analysis/charts/figures.pptx
@@ -5,16 +5,17 @@
     <p:sldMasterId id="2147483648" r:id="rId1"/>
   </p:sldMasterIdLst>
   <p:sldIdLst>
-    <p:sldId id="256" r:id="rId2"/>
-    <p:sldId id="257" r:id="rId3"/>
-    <p:sldId id="258" r:id="rId4"/>
-    <p:sldId id="259" r:id="rId5"/>
-    <p:sldId id="262" r:id="rId6"/>
-    <p:sldId id="260" r:id="rId7"/>
-    <p:sldId id="261" r:id="rId8"/>
-    <p:sldId id="263" r:id="rId9"/>
-    <p:sldId id="264" r:id="rId10"/>
-    <p:sldId id="265" r:id="rId11"/>
+    <p:sldId id="266" r:id="rId2"/>
+    <p:sldId id="256" r:id="rId3"/>
+    <p:sldId id="257" r:id="rId4"/>
+    <p:sldId id="258" r:id="rId5"/>
+    <p:sldId id="259" r:id="rId6"/>
+    <p:sldId id="262" r:id="rId7"/>
+    <p:sldId id="260" r:id="rId8"/>
+    <p:sldId id="261" r:id="rId9"/>
+    <p:sldId id="263" r:id="rId10"/>
+    <p:sldId id="264" r:id="rId11"/>
+    <p:sldId id="265" r:id="rId12"/>
   </p:sldIdLst>
   <p:sldSz cx="12192000" cy="6858000"/>
   <p:notesSz cx="6858000" cy="9144000"/>
@@ -268,7 +269,7 @@
           <a:p>
             <a:fld id="{3B2CC345-873D-4984-B66F-B40C09CA00A9}" type="datetimeFigureOut">
               <a:rPr lang="en-US" smtClean="0"/>
-              <a:t>4/22/2021</a:t>
+              <a:t>4/27/2021</a:t>
             </a:fld>
             <a:endParaRPr lang="en-US"/>
           </a:p>
@@ -466,7 +467,7 @@
           <a:p>
             <a:fld id="{3B2CC345-873D-4984-B66F-B40C09CA00A9}" type="datetimeFigureOut">
               <a:rPr lang="en-US" smtClean="0"/>
-              <a:t>4/22/2021</a:t>
+              <a:t>4/27/2021</a:t>
             </a:fld>
             <a:endParaRPr lang="en-US"/>
           </a:p>
@@ -674,7 +675,7 @@
           <a:p>
             <a:fld id="{3B2CC345-873D-4984-B66F-B40C09CA00A9}" type="datetimeFigureOut">
               <a:rPr lang="en-US" smtClean="0"/>
-              <a:t>4/22/2021</a:t>
+              <a:t>4/27/2021</a:t>
             </a:fld>
             <a:endParaRPr lang="en-US"/>
           </a:p>
@@ -872,7 +873,7 @@
           <a:p>
             <a:fld id="{3B2CC345-873D-4984-B66F-B40C09CA00A9}" type="datetimeFigureOut">
               <a:rPr lang="en-US" smtClean="0"/>
-              <a:t>4/22/2021</a:t>
+              <a:t>4/27/2021</a:t>
             </a:fld>
             <a:endParaRPr lang="en-US"/>
           </a:p>
@@ -1147,7 +1148,7 @@
           <a:p>
             <a:fld id="{3B2CC345-873D-4984-B66F-B40C09CA00A9}" type="datetimeFigureOut">
               <a:rPr lang="en-US" smtClean="0"/>
-              <a:t>4/22/2021</a:t>
+              <a:t>4/27/2021</a:t>
             </a:fld>
             <a:endParaRPr lang="en-US"/>
           </a:p>
@@ -1412,7 +1413,7 @@
           <a:p>
             <a:fld id="{3B2CC345-873D-4984-B66F-B40C09CA00A9}" type="datetimeFigureOut">
               <a:rPr lang="en-US" smtClean="0"/>
-              <a:t>4/22/2021</a:t>
+              <a:t>4/27/2021</a:t>
             </a:fld>
             <a:endParaRPr lang="en-US"/>
           </a:p>
@@ -1824,7 +1825,7 @@
           <a:p>
             <a:fld id="{3B2CC345-873D-4984-B66F-B40C09CA00A9}" type="datetimeFigureOut">
               <a:rPr lang="en-US" smtClean="0"/>
-              <a:t>4/22/2021</a:t>
+              <a:t>4/27/2021</a:t>
             </a:fld>
             <a:endParaRPr lang="en-US"/>
           </a:p>
@@ -1965,7 +1966,7 @@
           <a:p>
             <a:fld id="{3B2CC345-873D-4984-B66F-B40C09CA00A9}" type="datetimeFigureOut">
               <a:rPr lang="en-US" smtClean="0"/>
-              <a:t>4/22/2021</a:t>
+              <a:t>4/27/2021</a:t>
             </a:fld>
             <a:endParaRPr lang="en-US"/>
           </a:p>
@@ -2078,7 +2079,7 @@
           <a:p>
             <a:fld id="{3B2CC345-873D-4984-B66F-B40C09CA00A9}" type="datetimeFigureOut">
               <a:rPr lang="en-US" smtClean="0"/>
-              <a:t>4/22/2021</a:t>
+              <a:t>4/27/2021</a:t>
             </a:fld>
             <a:endParaRPr lang="en-US"/>
           </a:p>
@@ -2389,7 +2390,7 @@
           <a:p>
             <a:fld id="{3B2CC345-873D-4984-B66F-B40C09CA00A9}" type="datetimeFigureOut">
               <a:rPr lang="en-US" smtClean="0"/>
-              <a:t>4/22/2021</a:t>
+              <a:t>4/27/2021</a:t>
             </a:fld>
             <a:endParaRPr lang="en-US"/>
           </a:p>
@@ -2677,7 +2678,7 @@
           <a:p>
             <a:fld id="{3B2CC345-873D-4984-B66F-B40C09CA00A9}" type="datetimeFigureOut">
               <a:rPr lang="en-US" smtClean="0"/>
-              <a:t>4/22/2021</a:t>
+              <a:t>4/27/2021</a:t>
             </a:fld>
             <a:endParaRPr lang="en-US"/>
           </a:p>
@@ -2918,7 +2919,7 @@
           <a:p>
             <a:fld id="{3B2CC345-873D-4984-B66F-B40C09CA00A9}" type="datetimeFigureOut">
               <a:rPr lang="en-US" smtClean="0"/>
-              <a:t>4/22/2021</a:t>
+              <a:t>4/27/2021</a:t>
             </a:fld>
             <a:endParaRPr lang="en-US"/>
           </a:p>
@@ -3335,40 +3336,311 @@
           <a:chExt cx="0" cy="0"/>
         </a:xfrm>
       </p:grpSpPr>
-      <p:pic>
-        <p:nvPicPr>
-          <p:cNvPr id="7" name="Picture 6">
-            <a:extLst>
-              <a:ext uri="{FF2B5EF4-FFF2-40B4-BE49-F238E27FC236}">
-                <a16:creationId xmlns:a16="http://schemas.microsoft.com/office/drawing/2014/main" id="{BB3D565B-69CD-4AA2-A329-F028FFE01676}"/>
-              </a:ext>
-            </a:extLst>
-          </p:cNvPr>
-          <p:cNvPicPr>
-            <a:picLocks noChangeAspect="1"/>
-          </p:cNvPicPr>
+      <p:grpSp>
+        <p:nvGrpSpPr>
+          <p:cNvPr id="9" name="Group 8">
+            <a:extLst>
+              <a:ext uri="{FF2B5EF4-FFF2-40B4-BE49-F238E27FC236}">
+                <a16:creationId xmlns:a16="http://schemas.microsoft.com/office/drawing/2014/main" id="{E8300DEB-EFB1-4AEB-B5E4-2492D6B9DF19}"/>
+              </a:ext>
+            </a:extLst>
+          </p:cNvPr>
+          <p:cNvGrpSpPr/>
           <p:nvPr/>
-        </p:nvPicPr>
-        <p:blipFill>
-          <a:blip r:embed="rId2"/>
-          <a:stretch>
-            <a:fillRect/>
-          </a:stretch>
-        </p:blipFill>
-        <p:spPr>
+        </p:nvGrpSpPr>
+        <p:grpSpPr>
           <a:xfrm>
-            <a:off x="2101253" y="975575"/>
-            <a:ext cx="3200677" cy="2286198"/>
+            <a:off x="757727" y="1028492"/>
+            <a:ext cx="10658133" cy="4801016"/>
+            <a:chOff x="757727" y="1028492"/>
+            <a:chExt cx="10658133" cy="4801016"/>
           </a:xfrm>
-          <a:prstGeom prst="rect">
-            <a:avLst/>
-          </a:prstGeom>
-        </p:spPr>
-      </p:pic>
+        </p:grpSpPr>
+        <p:pic>
+          <p:nvPicPr>
+            <p:cNvPr id="3" name="Picture 2" descr="Graphical user interface, application, website&#10;&#10;Description automatically generated">
+              <a:extLst>
+                <a:ext uri="{FF2B5EF4-FFF2-40B4-BE49-F238E27FC236}">
+                  <a16:creationId xmlns:a16="http://schemas.microsoft.com/office/drawing/2014/main" id="{80B99CCA-C16A-46E9-BDDA-927328C736FC}"/>
+                </a:ext>
+              </a:extLst>
+            </p:cNvPr>
+            <p:cNvPicPr>
+              <a:picLocks noChangeAspect="1"/>
+            </p:cNvPicPr>
+            <p:nvPr/>
+          </p:nvPicPr>
+          <p:blipFill rotWithShape="1">
+            <a:blip r:embed="rId2">
+              <a:extLst>
+                <a:ext uri="{28A0092B-C50C-407E-A947-70E740481C1C}">
+                  <a14:useLocalDpi xmlns:a14="http://schemas.microsoft.com/office/drawing/2010/main" val="0"/>
+                </a:ext>
+              </a:extLst>
+            </a:blip>
+            <a:srcRect l="1" r="172"/>
+            <a:stretch/>
+          </p:blipFill>
+          <p:spPr>
+            <a:xfrm>
+              <a:off x="757727" y="1028492"/>
+              <a:ext cx="10658133" cy="4801016"/>
+            </a:xfrm>
+            <a:prstGeom prst="rect">
+              <a:avLst/>
+            </a:prstGeom>
+          </p:spPr>
+        </p:pic>
+        <p:sp>
+          <p:nvSpPr>
+            <p:cNvPr id="4" name="Oval 3">
+              <a:extLst>
+                <a:ext uri="{FF2B5EF4-FFF2-40B4-BE49-F238E27FC236}">
+                  <a16:creationId xmlns:a16="http://schemas.microsoft.com/office/drawing/2014/main" id="{BE1407CF-2B10-454B-ACCA-A209E7CD5972}"/>
+                </a:ext>
+              </a:extLst>
+            </p:cNvPr>
+            <p:cNvSpPr/>
+            <p:nvPr/>
+          </p:nvSpPr>
+          <p:spPr>
+            <a:xfrm>
+              <a:off x="3631370" y="1869244"/>
+              <a:ext cx="274320" cy="274320"/>
+            </a:xfrm>
+            <a:prstGeom prst="ellipse">
+              <a:avLst/>
+            </a:prstGeom>
+          </p:spPr>
+          <p:style>
+            <a:lnRef idx="2">
+              <a:schemeClr val="dk1">
+                <a:shade val="50000"/>
+              </a:schemeClr>
+            </a:lnRef>
+            <a:fillRef idx="1">
+              <a:schemeClr val="dk1"/>
+            </a:fillRef>
+            <a:effectRef idx="0">
+              <a:schemeClr val="dk1"/>
+            </a:effectRef>
+            <a:fontRef idx="minor">
+              <a:schemeClr val="lt1"/>
+            </a:fontRef>
+          </p:style>
+          <p:txBody>
+            <a:bodyPr rtlCol="0" anchor="ctr"/>
+            <a:lstStyle/>
+            <a:p>
+              <a:pPr algn="ctr"/>
+              <a:r>
+                <a:rPr lang="en-US" dirty="0"/>
+                <a:t>a</a:t>
+              </a:r>
+            </a:p>
+          </p:txBody>
+        </p:sp>
+        <p:sp>
+          <p:nvSpPr>
+            <p:cNvPr id="5" name="Oval 4">
+              <a:extLst>
+                <a:ext uri="{FF2B5EF4-FFF2-40B4-BE49-F238E27FC236}">
+                  <a16:creationId xmlns:a16="http://schemas.microsoft.com/office/drawing/2014/main" id="{41EEE4F2-2B89-4280-B6BF-F82A33F085AC}"/>
+                </a:ext>
+              </a:extLst>
+            </p:cNvPr>
+            <p:cNvSpPr/>
+            <p:nvPr/>
+          </p:nvSpPr>
+          <p:spPr>
+            <a:xfrm>
+              <a:off x="1201289" y="2534342"/>
+              <a:ext cx="274320" cy="274320"/>
+            </a:xfrm>
+            <a:prstGeom prst="ellipse">
+              <a:avLst/>
+            </a:prstGeom>
+          </p:spPr>
+          <p:style>
+            <a:lnRef idx="2">
+              <a:schemeClr val="dk1">
+                <a:shade val="50000"/>
+              </a:schemeClr>
+            </a:lnRef>
+            <a:fillRef idx="1">
+              <a:schemeClr val="dk1"/>
+            </a:fillRef>
+            <a:effectRef idx="0">
+              <a:schemeClr val="dk1"/>
+            </a:effectRef>
+            <a:fontRef idx="minor">
+              <a:schemeClr val="lt1"/>
+            </a:fontRef>
+          </p:style>
+          <p:txBody>
+            <a:bodyPr rtlCol="0" anchor="ctr"/>
+            <a:lstStyle/>
+            <a:p>
+              <a:pPr algn="ctr"/>
+              <a:r>
+                <a:rPr lang="en-US" dirty="0"/>
+                <a:t>b</a:t>
+              </a:r>
+            </a:p>
+          </p:txBody>
+        </p:sp>
+        <p:sp>
+          <p:nvSpPr>
+            <p:cNvPr id="6" name="Oval 5">
+              <a:extLst>
+                <a:ext uri="{FF2B5EF4-FFF2-40B4-BE49-F238E27FC236}">
+                  <a16:creationId xmlns:a16="http://schemas.microsoft.com/office/drawing/2014/main" id="{DE2295A5-78DC-4FDC-A753-60D265FA423D}"/>
+                </a:ext>
+              </a:extLst>
+            </p:cNvPr>
+            <p:cNvSpPr/>
+            <p:nvPr/>
+          </p:nvSpPr>
+          <p:spPr>
+            <a:xfrm>
+              <a:off x="6479308" y="2534342"/>
+              <a:ext cx="274320" cy="274320"/>
+            </a:xfrm>
+            <a:prstGeom prst="ellipse">
+              <a:avLst/>
+            </a:prstGeom>
+          </p:spPr>
+          <p:style>
+            <a:lnRef idx="2">
+              <a:schemeClr val="dk1">
+                <a:shade val="50000"/>
+              </a:schemeClr>
+            </a:lnRef>
+            <a:fillRef idx="1">
+              <a:schemeClr val="dk1"/>
+            </a:fillRef>
+            <a:effectRef idx="0">
+              <a:schemeClr val="dk1"/>
+            </a:effectRef>
+            <a:fontRef idx="minor">
+              <a:schemeClr val="lt1"/>
+            </a:fontRef>
+          </p:style>
+          <p:txBody>
+            <a:bodyPr rtlCol="0" anchor="ctr"/>
+            <a:lstStyle/>
+            <a:p>
+              <a:pPr algn="ctr"/>
+              <a:r>
+                <a:rPr lang="en-US" dirty="0"/>
+                <a:t>c</a:t>
+              </a:r>
+            </a:p>
+          </p:txBody>
+        </p:sp>
+        <p:sp>
+          <p:nvSpPr>
+            <p:cNvPr id="7" name="Oval 6">
+              <a:extLst>
+                <a:ext uri="{FF2B5EF4-FFF2-40B4-BE49-F238E27FC236}">
+                  <a16:creationId xmlns:a16="http://schemas.microsoft.com/office/drawing/2014/main" id="{D0295353-3F93-44EC-8C8B-0560C883E796}"/>
+                </a:ext>
+              </a:extLst>
+            </p:cNvPr>
+            <p:cNvSpPr/>
+            <p:nvPr/>
+          </p:nvSpPr>
+          <p:spPr>
+            <a:xfrm>
+              <a:off x="2866850" y="3199440"/>
+              <a:ext cx="274320" cy="274320"/>
+            </a:xfrm>
+            <a:prstGeom prst="ellipse">
+              <a:avLst/>
+            </a:prstGeom>
+          </p:spPr>
+          <p:style>
+            <a:lnRef idx="2">
+              <a:schemeClr val="dk1">
+                <a:shade val="50000"/>
+              </a:schemeClr>
+            </a:lnRef>
+            <a:fillRef idx="1">
+              <a:schemeClr val="dk1"/>
+            </a:fillRef>
+            <a:effectRef idx="0">
+              <a:schemeClr val="dk1"/>
+            </a:effectRef>
+            <a:fontRef idx="minor">
+              <a:schemeClr val="lt1"/>
+            </a:fontRef>
+          </p:style>
+          <p:txBody>
+            <a:bodyPr rtlCol="0" anchor="ctr"/>
+            <a:lstStyle/>
+            <a:p>
+              <a:pPr algn="ctr"/>
+              <a:r>
+                <a:rPr lang="en-US" dirty="0"/>
+                <a:t>d</a:t>
+              </a:r>
+            </a:p>
+          </p:txBody>
+        </p:sp>
+        <p:sp>
+          <p:nvSpPr>
+            <p:cNvPr id="8" name="Oval 7">
+              <a:extLst>
+                <a:ext uri="{FF2B5EF4-FFF2-40B4-BE49-F238E27FC236}">
+                  <a16:creationId xmlns:a16="http://schemas.microsoft.com/office/drawing/2014/main" id="{1D756AAC-9D27-43DF-9053-6FB10AC9D125}"/>
+                </a:ext>
+              </a:extLst>
+            </p:cNvPr>
+            <p:cNvSpPr/>
+            <p:nvPr/>
+          </p:nvSpPr>
+          <p:spPr>
+            <a:xfrm>
+              <a:off x="812024" y="3619441"/>
+              <a:ext cx="274320" cy="274320"/>
+            </a:xfrm>
+            <a:prstGeom prst="ellipse">
+              <a:avLst/>
+            </a:prstGeom>
+          </p:spPr>
+          <p:style>
+            <a:lnRef idx="2">
+              <a:schemeClr val="dk1">
+                <a:shade val="50000"/>
+              </a:schemeClr>
+            </a:lnRef>
+            <a:fillRef idx="1">
+              <a:schemeClr val="dk1"/>
+            </a:fillRef>
+            <a:effectRef idx="0">
+              <a:schemeClr val="dk1"/>
+            </a:effectRef>
+            <a:fontRef idx="minor">
+              <a:schemeClr val="lt1"/>
+            </a:fontRef>
+          </p:style>
+          <p:txBody>
+            <a:bodyPr rtlCol="0" anchor="ctr"/>
+            <a:lstStyle/>
+            <a:p>
+              <a:pPr algn="ctr"/>
+              <a:r>
+                <a:rPr lang="en-US" dirty="0"/>
+                <a:t>e</a:t>
+              </a:r>
+            </a:p>
+          </p:txBody>
+        </p:sp>
+      </p:grpSp>
     </p:spTree>
     <p:extLst>
       <p:ext uri="{BB962C8B-B14F-4D97-AF65-F5344CB8AC3E}">
-        <p14:creationId xmlns:p14="http://schemas.microsoft.com/office/powerpoint/2010/main" val="4028035921"/>
+        <p14:creationId xmlns:p14="http://schemas.microsoft.com/office/powerpoint/2010/main" val="2115308728"/>
       </p:ext>
     </p:extLst>
   </p:cSld>
@@ -3379,6 +3651,128 @@
 </file>
 
 <file path=ppt/slides/slide10.xml><?xml version="1.0" encoding="utf-8"?>
+<p:sld xmlns:a="http://schemas.openxmlformats.org/drawingml/2006/main" xmlns:r="http://schemas.openxmlformats.org/officeDocument/2006/relationships" xmlns:p="http://schemas.openxmlformats.org/presentationml/2006/main">
+  <p:cSld>
+    <p:spTree>
+      <p:nvGrpSpPr>
+        <p:cNvPr id="1" name=""/>
+        <p:cNvGrpSpPr/>
+        <p:nvPr/>
+      </p:nvGrpSpPr>
+      <p:grpSpPr>
+        <a:xfrm>
+          <a:off x="0" y="0"/>
+          <a:ext cx="0" cy="0"/>
+          <a:chOff x="0" y="0"/>
+          <a:chExt cx="0" cy="0"/>
+        </a:xfrm>
+      </p:grpSpPr>
+      <p:grpSp>
+        <p:nvGrpSpPr>
+          <p:cNvPr id="6" name="Group 5">
+            <a:extLst>
+              <a:ext uri="{FF2B5EF4-FFF2-40B4-BE49-F238E27FC236}">
+                <a16:creationId xmlns:a16="http://schemas.microsoft.com/office/drawing/2014/main" id="{4872F904-CA7D-4A09-ADF8-817DC4B957E5}"/>
+              </a:ext>
+            </a:extLst>
+          </p:cNvPr>
+          <p:cNvGrpSpPr/>
+          <p:nvPr/>
+        </p:nvGrpSpPr>
+        <p:grpSpPr>
+          <a:xfrm>
+            <a:off x="1028233" y="1838416"/>
+            <a:ext cx="8838094" cy="2844444"/>
+            <a:chOff x="1028233" y="1838416"/>
+            <a:chExt cx="8838094" cy="2844444"/>
+          </a:xfrm>
+        </p:grpSpPr>
+        <p:pic>
+          <p:nvPicPr>
+            <p:cNvPr id="3" name="Picture 2" descr="Calendar&#10;&#10;Description automatically generated with medium confidence">
+              <a:extLst>
+                <a:ext uri="{FF2B5EF4-FFF2-40B4-BE49-F238E27FC236}">
+                  <a16:creationId xmlns:a16="http://schemas.microsoft.com/office/drawing/2014/main" id="{D9CB664A-CEE9-4DEC-A299-1B3D3531F6C5}"/>
+                </a:ext>
+              </a:extLst>
+            </p:cNvPr>
+            <p:cNvPicPr>
+              <a:picLocks noChangeAspect="1"/>
+            </p:cNvPicPr>
+            <p:nvPr/>
+          </p:nvPicPr>
+          <p:blipFill rotWithShape="1">
+            <a:blip r:embed="rId2">
+              <a:extLst>
+                <a:ext uri="{28A0092B-C50C-407E-A947-70E740481C1C}">
+                  <a14:useLocalDpi xmlns:a14="http://schemas.microsoft.com/office/drawing/2010/main" val="0"/>
+                </a:ext>
+              </a:extLst>
+            </a:blip>
+            <a:srcRect l="50000"/>
+            <a:stretch/>
+          </p:blipFill>
+          <p:spPr>
+            <a:xfrm>
+              <a:off x="6920296" y="1838416"/>
+              <a:ext cx="2946031" cy="2844444"/>
+            </a:xfrm>
+            <a:prstGeom prst="rect">
+              <a:avLst/>
+            </a:prstGeom>
+          </p:spPr>
+        </p:pic>
+        <p:pic>
+          <p:nvPicPr>
+            <p:cNvPr id="5" name="Picture 4" descr="Chart, box and whisker chart&#10;&#10;Description automatically generated">
+              <a:extLst>
+                <a:ext uri="{FF2B5EF4-FFF2-40B4-BE49-F238E27FC236}">
+                  <a16:creationId xmlns:a16="http://schemas.microsoft.com/office/drawing/2014/main" id="{B0B91903-2A3E-48F8-AFB1-4577A0A01DB9}"/>
+                </a:ext>
+              </a:extLst>
+            </p:cNvPr>
+            <p:cNvPicPr>
+              <a:picLocks noChangeAspect="1"/>
+            </p:cNvPicPr>
+            <p:nvPr/>
+          </p:nvPicPr>
+          <p:blipFill>
+            <a:blip r:embed="rId3">
+              <a:extLst>
+                <a:ext uri="{28A0092B-C50C-407E-A947-70E740481C1C}">
+                  <a14:useLocalDpi xmlns:a14="http://schemas.microsoft.com/office/drawing/2010/main" val="0"/>
+                </a:ext>
+              </a:extLst>
+            </a:blip>
+            <a:stretch>
+              <a:fillRect/>
+            </a:stretch>
+          </p:blipFill>
+          <p:spPr>
+            <a:xfrm>
+              <a:off x="1028233" y="1838416"/>
+              <a:ext cx="5892063" cy="2844444"/>
+            </a:xfrm>
+            <a:prstGeom prst="rect">
+              <a:avLst/>
+            </a:prstGeom>
+          </p:spPr>
+        </p:pic>
+      </p:grpSp>
+    </p:spTree>
+    <p:extLst>
+      <p:ext uri="{BB962C8B-B14F-4D97-AF65-F5344CB8AC3E}">
+        <p14:creationId xmlns:p14="http://schemas.microsoft.com/office/powerpoint/2010/main" val="1415894141"/>
+      </p:ext>
+    </p:extLst>
+  </p:cSld>
+  <p:clrMapOvr>
+    <a:masterClrMapping/>
+  </p:clrMapOvr>
+</p:sld>
+</file>
+
+<file path=ppt/slides/slide11.xml><?xml version="1.0" encoding="utf-8"?>
 <p:sld xmlns:a="http://schemas.openxmlformats.org/drawingml/2006/main" xmlns:r="http://schemas.openxmlformats.org/officeDocument/2006/relationships" xmlns:p="http://schemas.openxmlformats.org/presentationml/2006/main">
   <p:cSld>
     <p:spTree>
@@ -3589,6 +3983,66 @@
       </p:grpSpPr>
       <p:pic>
         <p:nvPicPr>
+          <p:cNvPr id="7" name="Picture 6">
+            <a:extLst>
+              <a:ext uri="{FF2B5EF4-FFF2-40B4-BE49-F238E27FC236}">
+                <a16:creationId xmlns:a16="http://schemas.microsoft.com/office/drawing/2014/main" id="{BB3D565B-69CD-4AA2-A329-F028FFE01676}"/>
+              </a:ext>
+            </a:extLst>
+          </p:cNvPr>
+          <p:cNvPicPr>
+            <a:picLocks noChangeAspect="1"/>
+          </p:cNvPicPr>
+          <p:nvPr/>
+        </p:nvPicPr>
+        <p:blipFill>
+          <a:blip r:embed="rId2"/>
+          <a:stretch>
+            <a:fillRect/>
+          </a:stretch>
+        </p:blipFill>
+        <p:spPr>
+          <a:xfrm>
+            <a:off x="2101253" y="975575"/>
+            <a:ext cx="3200677" cy="2286198"/>
+          </a:xfrm>
+          <a:prstGeom prst="rect">
+            <a:avLst/>
+          </a:prstGeom>
+        </p:spPr>
+      </p:pic>
+    </p:spTree>
+    <p:extLst>
+      <p:ext uri="{BB962C8B-B14F-4D97-AF65-F5344CB8AC3E}">
+        <p14:creationId xmlns:p14="http://schemas.microsoft.com/office/powerpoint/2010/main" val="4028035921"/>
+      </p:ext>
+    </p:extLst>
+  </p:cSld>
+  <p:clrMapOvr>
+    <a:masterClrMapping/>
+  </p:clrMapOvr>
+</p:sld>
+</file>
+
+<file path=ppt/slides/slide3.xml><?xml version="1.0" encoding="utf-8"?>
+<p:sld xmlns:a="http://schemas.openxmlformats.org/drawingml/2006/main" xmlns:r="http://schemas.openxmlformats.org/officeDocument/2006/relationships" xmlns:p="http://schemas.openxmlformats.org/presentationml/2006/main">
+  <p:cSld>
+    <p:spTree>
+      <p:nvGrpSpPr>
+        <p:cNvPr id="1" name=""/>
+        <p:cNvGrpSpPr/>
+        <p:nvPr/>
+      </p:nvGrpSpPr>
+      <p:grpSpPr>
+        <a:xfrm>
+          <a:off x="0" y="0"/>
+          <a:ext cx="0" cy="0"/>
+          <a:chOff x="0" y="0"/>
+          <a:chExt cx="0" cy="0"/>
+        </a:xfrm>
+      </p:grpSpPr>
+      <p:pic>
+        <p:nvPicPr>
           <p:cNvPr id="6" name="Picture 5">
             <a:extLst>
               <a:ext uri="{FF2B5EF4-FFF2-40B4-BE49-F238E27FC236}">
@@ -3630,7 +4084,7 @@
 </p:sld>
 </file>
 
-<file path=ppt/slides/slide3.xml><?xml version="1.0" encoding="utf-8"?>
+<file path=ppt/slides/slide4.xml><?xml version="1.0" encoding="utf-8"?>
 <p:sld xmlns:a="http://schemas.openxmlformats.org/drawingml/2006/main" xmlns:r="http://schemas.openxmlformats.org/officeDocument/2006/relationships" xmlns:p="http://schemas.openxmlformats.org/presentationml/2006/main">
   <p:cSld>
     <p:spTree>
@@ -4010,7 +4464,7 @@
         <p:spPr>
           <a:xfrm>
             <a:off x="1874421" y="821080"/>
-            <a:ext cx="3892146" cy="307777"/>
+            <a:ext cx="3870474" cy="307777"/>
           </a:xfrm>
           <a:prstGeom prst="rect">
             <a:avLst/>
@@ -4152,7 +4606,7 @@
 </p:sld>
 </file>
 
-<file path=ppt/slides/slide4.xml><?xml version="1.0" encoding="utf-8"?>
+<file path=ppt/slides/slide5.xml><?xml version="1.0" encoding="utf-8"?>
 <p:sld xmlns:a="http://schemas.openxmlformats.org/drawingml/2006/main" xmlns:r="http://schemas.openxmlformats.org/officeDocument/2006/relationships" xmlns:p="http://schemas.openxmlformats.org/presentationml/2006/main">
   <p:cSld>
     <p:spTree>
@@ -4795,7 +5249,7 @@
 </p:sld>
 </file>
 
-<file path=ppt/slides/slide5.xml><?xml version="1.0" encoding="utf-8"?>
+<file path=ppt/slides/slide6.xml><?xml version="1.0" encoding="utf-8"?>
 <p:sld xmlns:a="http://schemas.openxmlformats.org/drawingml/2006/main" xmlns:r="http://schemas.openxmlformats.org/officeDocument/2006/relationships" xmlns:p="http://schemas.openxmlformats.org/presentationml/2006/main">
   <p:cSld>
     <p:spTree>
@@ -5061,7 +5515,7 @@
 </p:sld>
 </file>
 
-<file path=ppt/slides/slide6.xml><?xml version="1.0" encoding="utf-8"?>
+<file path=ppt/slides/slide7.xml><?xml version="1.0" encoding="utf-8"?>
 <p:sld xmlns:a="http://schemas.openxmlformats.org/drawingml/2006/main" xmlns:r="http://schemas.openxmlformats.org/officeDocument/2006/relationships" xmlns:p="http://schemas.openxmlformats.org/presentationml/2006/main">
   <p:cSld>
     <p:spTree>
@@ -5387,7 +5841,7 @@
 </p:sld>
 </file>
 
-<file path=ppt/slides/slide7.xml><?xml version="1.0" encoding="utf-8"?>
+<file path=ppt/slides/slide8.xml><?xml version="1.0" encoding="utf-8"?>
 <p:sld xmlns:a="http://schemas.openxmlformats.org/drawingml/2006/main" xmlns:r="http://schemas.openxmlformats.org/officeDocument/2006/relationships" xmlns:p="http://schemas.openxmlformats.org/presentationml/2006/main">
   <p:cSld>
     <p:spTree>
@@ -5625,7 +6079,7 @@
 </p:sld>
 </file>
 
-<file path=ppt/slides/slide8.xml><?xml version="1.0" encoding="utf-8"?>
+<file path=ppt/slides/slide9.xml><?xml version="1.0" encoding="utf-8"?>
 <p:sld xmlns:a="http://schemas.openxmlformats.org/drawingml/2006/main" xmlns:r="http://schemas.openxmlformats.org/officeDocument/2006/relationships" xmlns:p="http://schemas.openxmlformats.org/presentationml/2006/main">
   <p:cSld>
     <p:spTree>
@@ -5682,128 +6136,6 @@
     <p:extLst>
       <p:ext uri="{BB962C8B-B14F-4D97-AF65-F5344CB8AC3E}">
         <p14:creationId xmlns:p14="http://schemas.microsoft.com/office/powerpoint/2010/main" val="3958827437"/>
-      </p:ext>
-    </p:extLst>
-  </p:cSld>
-  <p:clrMapOvr>
-    <a:masterClrMapping/>
-  </p:clrMapOvr>
-</p:sld>
-</file>
-
-<file path=ppt/slides/slide9.xml><?xml version="1.0" encoding="utf-8"?>
-<p:sld xmlns:a="http://schemas.openxmlformats.org/drawingml/2006/main" xmlns:r="http://schemas.openxmlformats.org/officeDocument/2006/relationships" xmlns:p="http://schemas.openxmlformats.org/presentationml/2006/main">
-  <p:cSld>
-    <p:spTree>
-      <p:nvGrpSpPr>
-        <p:cNvPr id="1" name=""/>
-        <p:cNvGrpSpPr/>
-        <p:nvPr/>
-      </p:nvGrpSpPr>
-      <p:grpSpPr>
-        <a:xfrm>
-          <a:off x="0" y="0"/>
-          <a:ext cx="0" cy="0"/>
-          <a:chOff x="0" y="0"/>
-          <a:chExt cx="0" cy="0"/>
-        </a:xfrm>
-      </p:grpSpPr>
-      <p:grpSp>
-        <p:nvGrpSpPr>
-          <p:cNvPr id="6" name="Group 5">
-            <a:extLst>
-              <a:ext uri="{FF2B5EF4-FFF2-40B4-BE49-F238E27FC236}">
-                <a16:creationId xmlns:a16="http://schemas.microsoft.com/office/drawing/2014/main" id="{4872F904-CA7D-4A09-ADF8-817DC4B957E5}"/>
-              </a:ext>
-            </a:extLst>
-          </p:cNvPr>
-          <p:cNvGrpSpPr/>
-          <p:nvPr/>
-        </p:nvGrpSpPr>
-        <p:grpSpPr>
-          <a:xfrm>
-            <a:off x="1028233" y="1838416"/>
-            <a:ext cx="8838094" cy="2844444"/>
-            <a:chOff x="1028233" y="1838416"/>
-            <a:chExt cx="8838094" cy="2844444"/>
-          </a:xfrm>
-        </p:grpSpPr>
-        <p:pic>
-          <p:nvPicPr>
-            <p:cNvPr id="3" name="Picture 2" descr="Calendar&#10;&#10;Description automatically generated with medium confidence">
-              <a:extLst>
-                <a:ext uri="{FF2B5EF4-FFF2-40B4-BE49-F238E27FC236}">
-                  <a16:creationId xmlns:a16="http://schemas.microsoft.com/office/drawing/2014/main" id="{D9CB664A-CEE9-4DEC-A299-1B3D3531F6C5}"/>
-                </a:ext>
-              </a:extLst>
-            </p:cNvPr>
-            <p:cNvPicPr>
-              <a:picLocks noChangeAspect="1"/>
-            </p:cNvPicPr>
-            <p:nvPr/>
-          </p:nvPicPr>
-          <p:blipFill rotWithShape="1">
-            <a:blip r:embed="rId2">
-              <a:extLst>
-                <a:ext uri="{28A0092B-C50C-407E-A947-70E740481C1C}">
-                  <a14:useLocalDpi xmlns:a14="http://schemas.microsoft.com/office/drawing/2010/main" val="0"/>
-                </a:ext>
-              </a:extLst>
-            </a:blip>
-            <a:srcRect l="50000"/>
-            <a:stretch/>
-          </p:blipFill>
-          <p:spPr>
-            <a:xfrm>
-              <a:off x="6920296" y="1838416"/>
-              <a:ext cx="2946031" cy="2844444"/>
-            </a:xfrm>
-            <a:prstGeom prst="rect">
-              <a:avLst/>
-            </a:prstGeom>
-          </p:spPr>
-        </p:pic>
-        <p:pic>
-          <p:nvPicPr>
-            <p:cNvPr id="5" name="Picture 4" descr="Chart, box and whisker chart&#10;&#10;Description automatically generated">
-              <a:extLst>
-                <a:ext uri="{FF2B5EF4-FFF2-40B4-BE49-F238E27FC236}">
-                  <a16:creationId xmlns:a16="http://schemas.microsoft.com/office/drawing/2014/main" id="{B0B91903-2A3E-48F8-AFB1-4577A0A01DB9}"/>
-                </a:ext>
-              </a:extLst>
-            </p:cNvPr>
-            <p:cNvPicPr>
-              <a:picLocks noChangeAspect="1"/>
-            </p:cNvPicPr>
-            <p:nvPr/>
-          </p:nvPicPr>
-          <p:blipFill>
-            <a:blip r:embed="rId3">
-              <a:extLst>
-                <a:ext uri="{28A0092B-C50C-407E-A947-70E740481C1C}">
-                  <a14:useLocalDpi xmlns:a14="http://schemas.microsoft.com/office/drawing/2010/main" val="0"/>
-                </a:ext>
-              </a:extLst>
-            </a:blip>
-            <a:stretch>
-              <a:fillRect/>
-            </a:stretch>
-          </p:blipFill>
-          <p:spPr>
-            <a:xfrm>
-              <a:off x="1028233" y="1838416"/>
-              <a:ext cx="5892063" cy="2844444"/>
-            </a:xfrm>
-            <a:prstGeom prst="rect">
-              <a:avLst/>
-            </a:prstGeom>
-          </p:spPr>
-        </p:pic>
-      </p:grpSp>
-    </p:spTree>
-    <p:extLst>
-      <p:ext uri="{BB962C8B-B14F-4D97-AF65-F5344CB8AC3E}">
-        <p14:creationId xmlns:p14="http://schemas.microsoft.com/office/powerpoint/2010/main" val="1415894141"/>
       </p:ext>
     </p:extLst>
   </p:cSld>

</xml_diff>